<commit_message>
revise the batch order
</commit_message>
<xml_diff>
--- a/2019_fall_rotation_presentation.pptx
+++ b/2019_fall_rotation_presentation.pptx
@@ -210,7 +210,7 @@
           <a:p>
             <a:fld id="{0C9F3C88-0958-D44F-B6EB-D46BBD36CB29}" type="datetimeFigureOut">
               <a:rPr lang="en-US" smtClean="0"/>
-              <a:t>11/15/19</a:t>
+              <a:t>11/18/19</a:t>
             </a:fld>
             <a:endParaRPr lang="en-US"/>
           </a:p>
@@ -1265,61 +1265,148 @@
           <a:p>
             <a:r>
               <a:rPr lang="en-US" altLang="zh-CN" dirty="0"/>
-              <a:t>Cell</a:t>
-            </a:r>
-            <a:r>
-              <a:rPr lang="zh-CN" altLang="en-US" dirty="0"/>
-              <a:t> </a:t>
-            </a:r>
-            <a:r>
-              <a:rPr lang="en-US" altLang="zh-CN" dirty="0"/>
-              <a:t>proportion</a:t>
-            </a:r>
-            <a:r>
-              <a:rPr lang="zh-CN" altLang="en-US" dirty="0"/>
-              <a:t> </a:t>
-            </a:r>
-            <a:r>
-              <a:rPr lang="en-US" altLang="zh-CN" dirty="0"/>
-              <a:t>first,</a:t>
-            </a:r>
-          </a:p>
-          <a:p>
-            <a:r>
-              <a:rPr lang="en-US" altLang="zh-CN" dirty="0"/>
-              <a:t>1000</a:t>
-            </a:r>
-            <a:r>
-              <a:rPr lang="zh-CN" altLang="en-US" dirty="0"/>
-              <a:t> </a:t>
-            </a:r>
-            <a:r>
-              <a:rPr lang="en-US" altLang="zh-CN" dirty="0"/>
-              <a:t>cells</a:t>
-            </a:r>
-            <a:r>
-              <a:rPr lang="zh-CN" altLang="en-US" dirty="0"/>
-              <a:t> </a:t>
-            </a:r>
-            <a:r>
-              <a:rPr lang="en-US" altLang="zh-CN" dirty="0"/>
-              <a:t>in</a:t>
-            </a:r>
-            <a:r>
-              <a:rPr lang="zh-CN" altLang="en-US" dirty="0"/>
-              <a:t> </a:t>
-            </a:r>
-            <a:r>
-              <a:rPr lang="en-US" altLang="zh-CN" dirty="0"/>
-              <a:t>each</a:t>
-            </a:r>
-            <a:r>
-              <a:rPr lang="zh-CN" altLang="en-US" dirty="0"/>
-              <a:t> </a:t>
-            </a:r>
-            <a:r>
-              <a:rPr lang="en-US" altLang="zh-CN" dirty="0"/>
-              <a:t>batch</a:t>
+              <a:t>What</a:t>
+            </a:r>
+            <a:r>
+              <a:rPr lang="zh-CN" altLang="en-US" dirty="0"/>
+              <a:t> </a:t>
+            </a:r>
+            <a:r>
+              <a:rPr lang="en-US" altLang="zh-CN" dirty="0"/>
+              <a:t>figures</a:t>
+            </a:r>
+            <a:r>
+              <a:rPr lang="zh-CN" altLang="en-US" dirty="0"/>
+              <a:t> </a:t>
+            </a:r>
+            <a:r>
+              <a:rPr lang="en-US" altLang="zh-CN" dirty="0"/>
+              <a:t>to</a:t>
+            </a:r>
+            <a:r>
+              <a:rPr lang="zh-CN" altLang="en-US" dirty="0"/>
+              <a:t> </a:t>
+            </a:r>
+            <a:r>
+              <a:rPr lang="en-US" altLang="zh-CN" dirty="0"/>
+              <a:t>present?</a:t>
+            </a:r>
+            <a:r>
+              <a:rPr lang="zh-CN" altLang="en-US" dirty="0"/>
+              <a:t> </a:t>
+            </a:r>
+            <a:r>
+              <a:rPr lang="en-US" altLang="zh-CN" dirty="0"/>
+              <a:t>Do</a:t>
+            </a:r>
+            <a:r>
+              <a:rPr lang="zh-CN" altLang="en-US" dirty="0"/>
+              <a:t> </a:t>
+            </a:r>
+            <a:r>
+              <a:rPr lang="en-US" altLang="zh-CN" dirty="0"/>
+              <a:t>we</a:t>
+            </a:r>
+            <a:r>
+              <a:rPr lang="zh-CN" altLang="en-US" dirty="0"/>
+              <a:t> </a:t>
+            </a:r>
+            <a:r>
+              <a:rPr lang="en-US" altLang="zh-CN" dirty="0"/>
+              <a:t>need</a:t>
+            </a:r>
+            <a:r>
+              <a:rPr lang="zh-CN" altLang="en-US" dirty="0"/>
+              <a:t> </a:t>
+            </a:r>
+            <a:r>
+              <a:rPr lang="en-US" altLang="zh-CN" dirty="0"/>
+              <a:t>to</a:t>
+            </a:r>
+            <a:r>
+              <a:rPr lang="zh-CN" altLang="en-US" dirty="0"/>
+              <a:t> </a:t>
+            </a:r>
+            <a:r>
+              <a:rPr lang="en-US" altLang="zh-CN" dirty="0"/>
+              <a:t>present</a:t>
+            </a:r>
+            <a:r>
+              <a:rPr lang="zh-CN" altLang="en-US" dirty="0"/>
+              <a:t> </a:t>
+            </a:r>
+            <a:r>
+              <a:rPr lang="en-US" altLang="zh-CN" dirty="0"/>
+              <a:t>the</a:t>
+            </a:r>
+            <a:r>
+              <a:rPr lang="zh-CN" altLang="en-US" dirty="0"/>
+              <a:t> </a:t>
+            </a:r>
+            <a:r>
+              <a:rPr lang="en-US" altLang="zh-CN" dirty="0" err="1"/>
+              <a:t>Tsne</a:t>
+            </a:r>
+            <a:r>
+              <a:rPr lang="zh-CN" altLang="en-US" dirty="0"/>
+              <a:t> </a:t>
+            </a:r>
+            <a:r>
+              <a:rPr lang="en-US" altLang="zh-CN" dirty="0"/>
+              <a:t>plot</a:t>
+            </a:r>
+            <a:r>
+              <a:rPr lang="zh-CN" altLang="en-US" dirty="0"/>
+              <a:t> </a:t>
+            </a:r>
+            <a:r>
+              <a:rPr lang="en-US" altLang="zh-CN" dirty="0"/>
+              <a:t>&amp;</a:t>
+            </a:r>
+            <a:r>
+              <a:rPr lang="zh-CN" altLang="en-US" dirty="0"/>
+              <a:t> </a:t>
+            </a:r>
+            <a:r>
+              <a:rPr lang="en-US" altLang="zh-CN" dirty="0"/>
+              <a:t>clustering</a:t>
+            </a:r>
+            <a:r>
+              <a:rPr lang="zh-CN" altLang="en-US" dirty="0"/>
+              <a:t> </a:t>
+            </a:r>
+            <a:r>
+              <a:rPr lang="en-US" altLang="zh-CN" dirty="0"/>
+              <a:t>analysis</a:t>
+            </a:r>
+            <a:r>
+              <a:rPr lang="zh-CN" altLang="en-US" dirty="0"/>
+              <a:t> </a:t>
+            </a:r>
+            <a:r>
+              <a:rPr lang="en-US" altLang="zh-CN" dirty="0"/>
+              <a:t>results</a:t>
+            </a:r>
+            <a:r>
+              <a:rPr lang="zh-CN" altLang="en-US" dirty="0"/>
+              <a:t> </a:t>
+            </a:r>
+            <a:r>
+              <a:rPr lang="en-US" altLang="zh-CN" dirty="0"/>
+              <a:t>both?</a:t>
+            </a:r>
+          </a:p>
+          <a:p>
+            <a:endParaRPr lang="en-US" dirty="0"/>
+          </a:p>
+          <a:p>
+            <a:r>
+              <a:rPr lang="en-US" altLang="zh-CN" dirty="0"/>
+              <a:t>Show</a:t>
+            </a:r>
+            <a:r>
+              <a:rPr lang="zh-CN" altLang="en-US" dirty="0"/>
+              <a:t> </a:t>
             </a:r>
             <a:endParaRPr lang="en-US" dirty="0"/>
           </a:p>
@@ -1508,7 +1595,7 @@
           <a:p>
             <a:fld id="{78A30419-1D28-6948-8173-1374087F147F}" type="datetimeFigureOut">
               <a:rPr lang="en-US" smtClean="0"/>
-              <a:t>11/15/19</a:t>
+              <a:t>11/18/19</a:t>
             </a:fld>
             <a:endParaRPr lang="en-US"/>
           </a:p>
@@ -1706,7 +1793,7 @@
           <a:p>
             <a:fld id="{78A30419-1D28-6948-8173-1374087F147F}" type="datetimeFigureOut">
               <a:rPr lang="en-US" smtClean="0"/>
-              <a:t>11/15/19</a:t>
+              <a:t>11/18/19</a:t>
             </a:fld>
             <a:endParaRPr lang="en-US"/>
           </a:p>
@@ -1914,7 +2001,7 @@
           <a:p>
             <a:fld id="{78A30419-1D28-6948-8173-1374087F147F}" type="datetimeFigureOut">
               <a:rPr lang="en-US" smtClean="0"/>
-              <a:t>11/15/19</a:t>
+              <a:t>11/18/19</a:t>
             </a:fld>
             <a:endParaRPr lang="en-US"/>
           </a:p>
@@ -2112,7 +2199,7 @@
           <a:p>
             <a:fld id="{78A30419-1D28-6948-8173-1374087F147F}" type="datetimeFigureOut">
               <a:rPr lang="en-US" smtClean="0"/>
-              <a:t>11/15/19</a:t>
+              <a:t>11/18/19</a:t>
             </a:fld>
             <a:endParaRPr lang="en-US"/>
           </a:p>
@@ -2387,7 +2474,7 @@
           <a:p>
             <a:fld id="{78A30419-1D28-6948-8173-1374087F147F}" type="datetimeFigureOut">
               <a:rPr lang="en-US" smtClean="0"/>
-              <a:t>11/15/19</a:t>
+              <a:t>11/18/19</a:t>
             </a:fld>
             <a:endParaRPr lang="en-US"/>
           </a:p>
@@ -2652,7 +2739,7 @@
           <a:p>
             <a:fld id="{78A30419-1D28-6948-8173-1374087F147F}" type="datetimeFigureOut">
               <a:rPr lang="en-US" smtClean="0"/>
-              <a:t>11/15/19</a:t>
+              <a:t>11/18/19</a:t>
             </a:fld>
             <a:endParaRPr lang="en-US"/>
           </a:p>
@@ -3064,7 +3151,7 @@
           <a:p>
             <a:fld id="{78A30419-1D28-6948-8173-1374087F147F}" type="datetimeFigureOut">
               <a:rPr lang="en-US" smtClean="0"/>
-              <a:t>11/15/19</a:t>
+              <a:t>11/18/19</a:t>
             </a:fld>
             <a:endParaRPr lang="en-US"/>
           </a:p>
@@ -3205,7 +3292,7 @@
           <a:p>
             <a:fld id="{78A30419-1D28-6948-8173-1374087F147F}" type="datetimeFigureOut">
               <a:rPr lang="en-US" smtClean="0"/>
-              <a:t>11/15/19</a:t>
+              <a:t>11/18/19</a:t>
             </a:fld>
             <a:endParaRPr lang="en-US"/>
           </a:p>
@@ -3318,7 +3405,7 @@
           <a:p>
             <a:fld id="{78A30419-1D28-6948-8173-1374087F147F}" type="datetimeFigureOut">
               <a:rPr lang="en-US" smtClean="0"/>
-              <a:t>11/15/19</a:t>
+              <a:t>11/18/19</a:t>
             </a:fld>
             <a:endParaRPr lang="en-US"/>
           </a:p>
@@ -3629,7 +3716,7 @@
           <a:p>
             <a:fld id="{78A30419-1D28-6948-8173-1374087F147F}" type="datetimeFigureOut">
               <a:rPr lang="en-US" smtClean="0"/>
-              <a:t>11/15/19</a:t>
+              <a:t>11/18/19</a:t>
             </a:fld>
             <a:endParaRPr lang="en-US"/>
           </a:p>
@@ -3917,7 +4004,7 @@
           <a:p>
             <a:fld id="{78A30419-1D28-6948-8173-1374087F147F}" type="datetimeFigureOut">
               <a:rPr lang="en-US" smtClean="0"/>
-              <a:t>11/15/19</a:t>
+              <a:t>11/18/19</a:t>
             </a:fld>
             <a:endParaRPr lang="en-US"/>
           </a:p>
@@ -4158,7 +4245,7 @@
           <a:p>
             <a:fld id="{78A30419-1D28-6948-8173-1374087F147F}" type="datetimeFigureOut">
               <a:rPr lang="en-US" smtClean="0"/>
-              <a:t>11/15/19</a:t>
+              <a:t>11/18/19</a:t>
             </a:fld>
             <a:endParaRPr lang="en-US"/>
           </a:p>
@@ -14886,10 +14973,160 @@
             </a:r>
           </a:p>
           <a:p>
+            <a:r>
+              <a:rPr lang="en-US" altLang="zh-CN" dirty="0"/>
+              <a:t>[simply</a:t>
+            </a:r>
+            <a:r>
+              <a:rPr lang="zh-CN" altLang="en-US" dirty="0"/>
+              <a:t> </a:t>
+            </a:r>
+            <a:r>
+              <a:rPr lang="en-US" altLang="zh-CN" dirty="0"/>
+              <a:t>introduce</a:t>
+            </a:r>
+            <a:r>
+              <a:rPr lang="zh-CN" altLang="en-US" dirty="0"/>
+              <a:t> </a:t>
+            </a:r>
+            <a:r>
+              <a:rPr lang="en-US" altLang="zh-CN" dirty="0"/>
+              <a:t>the</a:t>
+            </a:r>
+            <a:r>
+              <a:rPr lang="zh-CN" altLang="en-US" dirty="0"/>
+              <a:t> </a:t>
+            </a:r>
+            <a:r>
+              <a:rPr lang="en-US" altLang="zh-CN" dirty="0"/>
+              <a:t>method</a:t>
+            </a:r>
+          </a:p>
+          <a:p>
             <a:endParaRPr lang="en-US" dirty="0"/>
           </a:p>
         </p:txBody>
       </p:sp>
+      <p:pic>
+        <p:nvPicPr>
+          <p:cNvPr id="5" name="Picture 4">
+            <a:extLst>
+              <a:ext uri="{FF2B5EF4-FFF2-40B4-BE49-F238E27FC236}">
+                <a16:creationId xmlns:a16="http://schemas.microsoft.com/office/drawing/2014/main" id="{40D7E8A6-9B63-1949-9E04-EA8E58A918B7}"/>
+              </a:ext>
+            </a:extLst>
+          </p:cNvPr>
+          <p:cNvPicPr>
+            <a:picLocks noChangeAspect="1"/>
+          </p:cNvPicPr>
+          <p:nvPr/>
+        </p:nvPicPr>
+        <p:blipFill>
+          <a:blip r:embed="rId2"/>
+          <a:stretch>
+            <a:fillRect/>
+          </a:stretch>
+        </p:blipFill>
+        <p:spPr>
+          <a:xfrm>
+            <a:off x="404032" y="3763533"/>
+            <a:ext cx="2228470" cy="2005623"/>
+          </a:xfrm>
+          <a:prstGeom prst="rect">
+            <a:avLst/>
+          </a:prstGeom>
+        </p:spPr>
+      </p:pic>
+      <p:pic>
+        <p:nvPicPr>
+          <p:cNvPr id="6" name="Picture 5">
+            <a:extLst>
+              <a:ext uri="{FF2B5EF4-FFF2-40B4-BE49-F238E27FC236}">
+                <a16:creationId xmlns:a16="http://schemas.microsoft.com/office/drawing/2014/main" id="{FDE99506-F770-4C4D-A749-BBED7E40998B}"/>
+              </a:ext>
+            </a:extLst>
+          </p:cNvPr>
+          <p:cNvPicPr>
+            <a:picLocks noChangeAspect="1"/>
+          </p:cNvPicPr>
+          <p:nvPr/>
+        </p:nvPicPr>
+        <p:blipFill>
+          <a:blip r:embed="rId3"/>
+          <a:stretch>
+            <a:fillRect/>
+          </a:stretch>
+        </p:blipFill>
+        <p:spPr>
+          <a:xfrm>
+            <a:off x="2702840" y="3866904"/>
+            <a:ext cx="2222631" cy="1902252"/>
+          </a:xfrm>
+          <a:prstGeom prst="rect">
+            <a:avLst/>
+          </a:prstGeom>
+        </p:spPr>
+      </p:pic>
+      <p:pic>
+        <p:nvPicPr>
+          <p:cNvPr id="7" name="Picture 6">
+            <a:extLst>
+              <a:ext uri="{FF2B5EF4-FFF2-40B4-BE49-F238E27FC236}">
+                <a16:creationId xmlns:a16="http://schemas.microsoft.com/office/drawing/2014/main" id="{14C4CCCA-668B-074E-A3C5-F37297EA5722}"/>
+              </a:ext>
+            </a:extLst>
+          </p:cNvPr>
+          <p:cNvPicPr>
+            <a:picLocks noChangeAspect="1"/>
+          </p:cNvPicPr>
+          <p:nvPr/>
+        </p:nvPicPr>
+        <p:blipFill>
+          <a:blip r:embed="rId4"/>
+          <a:stretch>
+            <a:fillRect/>
+          </a:stretch>
+        </p:blipFill>
+        <p:spPr>
+          <a:xfrm>
+            <a:off x="4960640" y="3866904"/>
+            <a:ext cx="2201183" cy="1882591"/>
+          </a:xfrm>
+          <a:prstGeom prst="rect">
+            <a:avLst/>
+          </a:prstGeom>
+        </p:spPr>
+      </p:pic>
+      <p:pic>
+        <p:nvPicPr>
+          <p:cNvPr id="8" name="Picture 7">
+            <a:extLst>
+              <a:ext uri="{FF2B5EF4-FFF2-40B4-BE49-F238E27FC236}">
+                <a16:creationId xmlns:a16="http://schemas.microsoft.com/office/drawing/2014/main" id="{E15018AD-E05C-6542-961C-CC9F725D227C}"/>
+              </a:ext>
+            </a:extLst>
+          </p:cNvPr>
+          <p:cNvPicPr>
+            <a:picLocks noChangeAspect="1"/>
+          </p:cNvPicPr>
+          <p:nvPr/>
+        </p:nvPicPr>
+        <p:blipFill>
+          <a:blip r:embed="rId5"/>
+          <a:stretch>
+            <a:fillRect/>
+          </a:stretch>
+        </p:blipFill>
+        <p:spPr>
+          <a:xfrm>
+            <a:off x="7226300" y="3881865"/>
+            <a:ext cx="4227146" cy="1887291"/>
+          </a:xfrm>
+          <a:prstGeom prst="rect">
+            <a:avLst/>
+          </a:prstGeom>
+        </p:spPr>
+      </p:pic>
     </p:spTree>
     <p:extLst>
       <p:ext uri="{BB962C8B-B14F-4D97-AF65-F5344CB8AC3E}">
@@ -20111,7 +20348,7 @@
 </file>
 
 <file path=ppt/slides/slide8.xml><?xml version="1.0" encoding="utf-8"?>
-<p:sld xmlns:a="http://schemas.openxmlformats.org/drawingml/2006/main" xmlns:r="http://schemas.openxmlformats.org/officeDocument/2006/relationships" xmlns:p="http://schemas.openxmlformats.org/presentationml/2006/main">
+<p:sld xmlns:a="http://schemas.openxmlformats.org/drawingml/2006/main" xmlns:r="http://schemas.openxmlformats.org/officeDocument/2006/relationships" xmlns:p="http://schemas.openxmlformats.org/presentationml/2006/main" show="0">
   <p:cSld>
     <p:spTree>
       <p:nvGrpSpPr>
@@ -21575,7 +21812,7 @@
 </file>
 
 <file path=ppt/slides/slide9.xml><?xml version="1.0" encoding="utf-8"?>
-<p:sld xmlns:a="http://schemas.openxmlformats.org/drawingml/2006/main" xmlns:r="http://schemas.openxmlformats.org/officeDocument/2006/relationships" xmlns:p="http://schemas.openxmlformats.org/presentationml/2006/main">
+<p:sld xmlns:a="http://schemas.openxmlformats.org/drawingml/2006/main" xmlns:r="http://schemas.openxmlformats.org/officeDocument/2006/relationships" xmlns:p="http://schemas.openxmlformats.org/presentationml/2006/main" show="0">
   <p:cSld>
     <p:spTree>
       <p:nvGrpSpPr>

</xml_diff>